<commit_message>
slides3f typos, edits in num_theory
</commit_message>
<xml_diff>
--- a/spring11/slides11/slides3f.pptx
+++ b/spring11/slides11/slides3f.pptx
@@ -7512,7 +7512,7 @@
               <a:t>A </a:t>
             </a:r>
             <a:r>
-              <a:rPr lang="en-US" sz="4800" kern="0" smtClean="0">
+              <a:rPr lang="en-US" sz="4800" kern="0" dirty="0" smtClean="0">
                 <a:solidFill>
                   <a:srgbClr val="0000FF"/>
                 </a:solidFill>
@@ -7522,7 +7522,7 @@
               <a:t>bi</a:t>
             </a:r>
             <a:r>
-              <a:rPr kumimoji="0" lang="en-US" sz="4800" b="0" i="0" u="none" strike="noStrike" kern="0" cap="none" spc="0" normalizeH="0" baseline="0" noProof="0" smtClean="0">
+              <a:rPr kumimoji="0" lang="en-US" sz="4800" b="0" i="0" u="none" strike="noStrike" kern="0" cap="none" spc="0" normalizeH="0" baseline="0" noProof="0" dirty="0" err="1" smtClean="0">
                 <a:ln>
                   <a:noFill/>
                 </a:ln>
@@ -7553,8 +7553,22 @@
                 <a:ea typeface="+mn-ea"/>
                 <a:cs typeface="Comic Sans MS"/>
               </a:rPr>
-              <a:t> C</a:t>
-            </a:r>
+              <a:t> B</a:t>
+            </a:r>
+            <a:endParaRPr kumimoji="0" lang="en-US" sz="4800" b="0" i="0" u="none" strike="noStrike" kern="0" cap="none" spc="0" normalizeH="0" baseline="0" noProof="0" dirty="0" smtClean="0">
+              <a:ln>
+                <a:noFill/>
+              </a:ln>
+              <a:solidFill>
+                <a:srgbClr val="0000FF"/>
+              </a:solidFill>
+              <a:effectLst/>
+              <a:uLnTx/>
+              <a:uFillTx/>
+              <a:latin typeface="Comic Sans MS"/>
+              <a:ea typeface="+mn-ea"/>
+              <a:cs typeface="Comic Sans MS"/>
+            </a:endParaRPr>
           </a:p>
         </p:txBody>
       </p:sp>
@@ -11250,11 +11264,7 @@
             </a:r>
             <a:r>
               <a:rPr lang="en-US" sz="4000" dirty="0" smtClean="0"/>
-              <a:t>bit</a:t>
-            </a:r>
-            <a:r>
-              <a:rPr lang="en-US" sz="4000" dirty="0" smtClean="0"/>
-              <a:t>-strings</a:t>
+              <a:t>bit-strings</a:t>
             </a:r>
             <a:endParaRPr lang="en-US" sz="4000" dirty="0"/>
           </a:p>
@@ -11444,47 +11454,7 @@
                 <a:latin typeface="Comic Sans MS" pitchFamily="66" charset="0"/>
                 <a:cs typeface="Comic Sans MS"/>
               </a:rPr>
-              <a:t> 1  </a:t>
-            </a:r>
-            <a:r>
-              <a:rPr lang="en-US" sz="4400" dirty="0" smtClean="0">
-                <a:solidFill>
-                  <a:srgbClr val="0000FF"/>
-                </a:solidFill>
-                <a:latin typeface="Comic Sans MS" pitchFamily="66" charset="0"/>
-                <a:cs typeface="Comic Sans MS"/>
-              </a:rPr>
-              <a:t>1</a:t>
-            </a:r>
-            <a:r>
-              <a:rPr lang="en-US" sz="4400" dirty="0" smtClean="0">
-                <a:solidFill>
-                  <a:srgbClr val="0000FF"/>
-                </a:solidFill>
-                <a:latin typeface="Comic Sans MS" pitchFamily="66" charset="0"/>
-                <a:cs typeface="Comic Sans MS"/>
-              </a:rPr>
-              <a:t> 0  0  1  </a:t>
-            </a:r>
-            <a:r>
-              <a:rPr lang="en-US" sz="4400" dirty="0" smtClean="0">
-                <a:solidFill>
-                  <a:srgbClr val="0000FF"/>
-                </a:solidFill>
-                <a:latin typeface="Comic Sans MS" pitchFamily="66" charset="0"/>
-                <a:cs typeface="Comic Sans MS"/>
-              </a:rPr>
-              <a:t>… </a:t>
-            </a:r>
-            <a:r>
-              <a:rPr lang="en-US" sz="4400" dirty="0" smtClean="0">
-                <a:solidFill>
-                  <a:srgbClr val="0000FF"/>
-                </a:solidFill>
-                <a:latin typeface="Comic Sans MS" pitchFamily="66" charset="0"/>
-                <a:cs typeface="Comic Sans MS"/>
-              </a:rPr>
-              <a:t>    </a:t>
+              <a:t> 1  1 0  0  1  …     </a:t>
             </a:r>
             <a:r>
               <a:rPr lang="en-US" sz="4800" dirty="0" smtClean="0">
@@ -11587,67 +11557,7 @@
                 <a:latin typeface="Comic Sans MS" pitchFamily="66" charset="0"/>
                 <a:cs typeface="Comic Sans MS"/>
               </a:rPr>
-              <a:t>{0, </a:t>
-            </a:r>
-            <a:r>
-              <a:rPr lang="en-US" sz="4400" dirty="0" smtClean="0">
-                <a:solidFill>
-                  <a:srgbClr val="0000FF"/>
-                </a:solidFill>
-                <a:latin typeface="Comic Sans MS" pitchFamily="66" charset="0"/>
-                <a:cs typeface="Comic Sans MS"/>
-              </a:rPr>
-              <a:t> , </a:t>
-            </a:r>
-            <a:r>
-              <a:rPr lang="en-US" sz="4400" dirty="0" smtClean="0">
-                <a:solidFill>
-                  <a:srgbClr val="0000FF"/>
-                </a:solidFill>
-                <a:latin typeface="Comic Sans MS" pitchFamily="66" charset="0"/>
-                <a:cs typeface="Comic Sans MS"/>
-              </a:rPr>
-              <a:t>2, 3,</a:t>
-            </a:r>
-            <a:r>
-              <a:rPr lang="en-US" sz="4400" dirty="0" smtClean="0">
-                <a:solidFill>
-                  <a:srgbClr val="0000FF"/>
-                </a:solidFill>
-                <a:latin typeface="Comic Sans MS" pitchFamily="66" charset="0"/>
-                <a:cs typeface="Comic Sans MS"/>
-              </a:rPr>
-              <a:t>  </a:t>
-            </a:r>
-            <a:r>
-              <a:rPr lang="en-US" sz="4400" dirty="0" smtClean="0">
-                <a:solidFill>
-                  <a:srgbClr val="0000FF"/>
-                </a:solidFill>
-                <a:latin typeface="Comic Sans MS" pitchFamily="66" charset="0"/>
-                <a:cs typeface="Comic Sans MS"/>
-              </a:rPr>
-              <a:t>,</a:t>
-            </a:r>
-            <a:r>
-              <a:rPr lang="en-US" sz="4400" dirty="0" smtClean="0">
-                <a:solidFill>
-                  <a:srgbClr val="0000FF"/>
-                </a:solidFill>
-                <a:latin typeface="Comic Sans MS" pitchFamily="66" charset="0"/>
-                <a:cs typeface="Comic Sans MS"/>
-              </a:rPr>
-              <a:t>  , 6, </a:t>
-            </a:r>
-            <a:r>
-              <a:rPr lang="en-US" sz="4400" dirty="0" smtClean="0">
-                <a:solidFill>
-                  <a:srgbClr val="0000FF"/>
-                </a:solidFill>
-                <a:latin typeface="Comic Sans MS" pitchFamily="66" charset="0"/>
-                <a:cs typeface="Comic Sans MS"/>
-              </a:rPr>
-              <a:t>…  } </a:t>
+              <a:t>{0,  , 2, 3,  ,  , 6, …  } </a:t>
             </a:r>
             <a:endParaRPr lang="en-US" sz="4400" dirty="0">
               <a:solidFill>
@@ -16301,7 +16211,7 @@
                   <a:srgbClr val="0000FF"/>
                 </a:solidFill>
               </a:rPr>
-              <a:t>pow</a:t>
+              <a:t>pow(A</a:t>
             </a:r>
             <a:r>
               <a:rPr lang="en-US" sz="3200" dirty="0" smtClean="0">
@@ -16309,7 +16219,7 @@
                   <a:srgbClr val="0000FF"/>
                 </a:solidFill>
               </a:rPr>
-              <a:t>(A) </a:t>
+              <a:t>) </a:t>
             </a:r>
             <a:r>
               <a:rPr lang="en-US" sz="3200" dirty="0" err="1" smtClean="0"/>
@@ -16330,7 +16240,11 @@
             </a:r>
             <a:r>
               <a:rPr lang="en-US" sz="3200" dirty="0" smtClean="0"/>
-              <a:t>bin-strings</a:t>
+              <a:t>bit-</a:t>
+            </a:r>
+            <a:r>
+              <a:rPr lang="en-US" sz="3200" dirty="0" smtClean="0"/>
+              <a:t>strings</a:t>
             </a:r>
             <a:endParaRPr lang="en-US" sz="3200" dirty="0"/>
           </a:p>

</xml_diff>